<commit_message>
V0.5: Video con Imagenes de inicio y cierre
</commit_message>
<xml_diff>
--- a/Imagenes/Inicio_Cierre.pptx
+++ b/Imagenes/Inicio_Cierre.pptx
@@ -3543,42 +3543,6 @@
           </a:prstGeom>
         </p:spPr>
       </p:pic>
-      <p:pic>
-        <p:nvPicPr>
-          <p:cNvPr id="12" name="Imagen 11" descr="Logotipo&#10;&#10;El contenido generado por IA puede ser incorrecto.">
-            <a:extLst>
-              <a:ext uri="{FF2B5EF4-FFF2-40B4-BE49-F238E27FC236}">
-                <a16:creationId xmlns:a16="http://schemas.microsoft.com/office/drawing/2014/main" id="{04D2E691-7F1A-73A8-3C48-98D3EE71C93F}"/>
-              </a:ext>
-            </a:extLst>
-          </p:cNvPr>
-          <p:cNvPicPr>
-            <a:picLocks noChangeAspect="1"/>
-          </p:cNvPicPr>
-          <p:nvPr/>
-        </p:nvPicPr>
-        <p:blipFill>
-          <a:blip r:embed="rId6">
-            <a:extLst>
-              <a:ext uri="{28A0092B-C50C-407E-A947-70E740481C1C}">
-                <a14:useLocalDpi xmlns:a14="http://schemas.microsoft.com/office/drawing/2010/main" val="0"/>
-              </a:ext>
-            </a:extLst>
-          </a:blip>
-          <a:stretch>
-            <a:fillRect/>
-          </a:stretch>
-        </p:blipFill>
-        <p:spPr>
-          <a:xfrm>
-            <a:off x="7165298" y="5035435"/>
-            <a:ext cx="1234814" cy="1491096"/>
-          </a:xfrm>
-          <a:prstGeom prst="rect">
-            <a:avLst/>
-          </a:prstGeom>
-        </p:spPr>
-      </p:pic>
       <p:sp>
         <p:nvSpPr>
           <p:cNvPr id="14" name="Subtítulo 2">
@@ -3777,7 +3741,7 @@
                   <a:schemeClr val="accent1"/>
                 </a:solidFill>
               </a:rPr>
-              <a:t>Leonardo Solis-Zamora, Dr. Marcelo Pérez, Dr. Joel Pérez</a:t>
+              <a:t>Leonardo Solis-Zamora, Joel Pérez, Dr. Marcelo Pérez </a:t>
             </a:r>
             <a:endParaRPr lang="es-419" sz="2800" b="1" dirty="0">
               <a:solidFill>
@@ -3787,6 +3751,42 @@
           </a:p>
         </p:txBody>
       </p:sp>
+      <p:pic>
+        <p:nvPicPr>
+          <p:cNvPr id="6" name="Imagen 5" descr="Imagen que contiene Texto&#10;&#10;El contenido generado por IA puede ser incorrecto.">
+            <a:extLst>
+              <a:ext uri="{FF2B5EF4-FFF2-40B4-BE49-F238E27FC236}">
+                <a16:creationId xmlns:a16="http://schemas.microsoft.com/office/drawing/2014/main" id="{23817E20-E9C5-20FF-4B34-1AA3A35BC785}"/>
+              </a:ext>
+            </a:extLst>
+          </p:cNvPr>
+          <p:cNvPicPr>
+            <a:picLocks noChangeAspect="1"/>
+          </p:cNvPicPr>
+          <p:nvPr/>
+        </p:nvPicPr>
+        <p:blipFill>
+          <a:blip r:embed="rId6">
+            <a:extLst>
+              <a:ext uri="{28A0092B-C50C-407E-A947-70E740481C1C}">
+                <a14:useLocalDpi xmlns:a14="http://schemas.microsoft.com/office/drawing/2010/main" val="0"/>
+              </a:ext>
+            </a:extLst>
+          </a:blip>
+          <a:stretch>
+            <a:fillRect/>
+          </a:stretch>
+        </p:blipFill>
+        <p:spPr>
+          <a:xfrm>
+            <a:off x="6977693" y="5099821"/>
+            <a:ext cx="2038585" cy="1350762"/>
+          </a:xfrm>
+          <a:prstGeom prst="rect">
+            <a:avLst/>
+          </a:prstGeom>
+        </p:spPr>
+      </p:pic>
     </p:spTree>
     <p:extLst>
       <p:ext uri="{BB962C8B-B14F-4D97-AF65-F5344CB8AC3E}">
@@ -4018,42 +4018,6 @@
           </a:prstGeom>
         </p:spPr>
       </p:pic>
-      <p:pic>
-        <p:nvPicPr>
-          <p:cNvPr id="12" name="Imagen 11" descr="Logotipo&#10;&#10;El contenido generado por IA puede ser incorrecto.">
-            <a:extLst>
-              <a:ext uri="{FF2B5EF4-FFF2-40B4-BE49-F238E27FC236}">
-                <a16:creationId xmlns:a16="http://schemas.microsoft.com/office/drawing/2014/main" id="{36D4FE50-2DE8-857B-2956-441032F51485}"/>
-              </a:ext>
-            </a:extLst>
-          </p:cNvPr>
-          <p:cNvPicPr>
-            <a:picLocks noChangeAspect="1"/>
-          </p:cNvPicPr>
-          <p:nvPr/>
-        </p:nvPicPr>
-        <p:blipFill>
-          <a:blip r:embed="rId6">
-            <a:extLst>
-              <a:ext uri="{28A0092B-C50C-407E-A947-70E740481C1C}">
-                <a14:useLocalDpi xmlns:a14="http://schemas.microsoft.com/office/drawing/2010/main" val="0"/>
-              </a:ext>
-            </a:extLst>
-          </a:blip>
-          <a:stretch>
-            <a:fillRect/>
-          </a:stretch>
-        </p:blipFill>
-        <p:spPr>
-          <a:xfrm>
-            <a:off x="7165298" y="5035435"/>
-            <a:ext cx="1234814" cy="1491096"/>
-          </a:xfrm>
-          <a:prstGeom prst="rect">
-            <a:avLst/>
-          </a:prstGeom>
-        </p:spPr>
-      </p:pic>
       <p:sp>
         <p:nvSpPr>
           <p:cNvPr id="14" name="Subtítulo 2">
@@ -4252,7 +4216,7 @@
                   <a:schemeClr val="accent1"/>
                 </a:solidFill>
               </a:rPr>
-              <a:t>Leonardo Solis-Zamora, Dr. Marcelo Pérez, Dr. Joel Pérez</a:t>
+              <a:t>Leonardo Solis-Zamora, Joel Pérez, Dr. Marcelo Pérez</a:t>
             </a:r>
             <a:endParaRPr lang="es-419" sz="2000" b="1" dirty="0">
               <a:solidFill>
@@ -4470,6 +4434,42 @@
           </a:p>
         </p:txBody>
       </p:sp>
+      <p:pic>
+        <p:nvPicPr>
+          <p:cNvPr id="7" name="Imagen 6" descr="Imagen que contiene Texto&#10;&#10;El contenido generado por IA puede ser incorrecto.">
+            <a:extLst>
+              <a:ext uri="{FF2B5EF4-FFF2-40B4-BE49-F238E27FC236}">
+                <a16:creationId xmlns:a16="http://schemas.microsoft.com/office/drawing/2014/main" id="{9CB3FB55-292C-4784-C978-D8ECEA34A7BB}"/>
+              </a:ext>
+            </a:extLst>
+          </p:cNvPr>
+          <p:cNvPicPr>
+            <a:picLocks noChangeAspect="1"/>
+          </p:cNvPicPr>
+          <p:nvPr/>
+        </p:nvPicPr>
+        <p:blipFill>
+          <a:blip r:embed="rId6">
+            <a:extLst>
+              <a:ext uri="{28A0092B-C50C-407E-A947-70E740481C1C}">
+                <a14:useLocalDpi xmlns:a14="http://schemas.microsoft.com/office/drawing/2010/main" val="0"/>
+              </a:ext>
+            </a:extLst>
+          </a:blip>
+          <a:stretch>
+            <a:fillRect/>
+          </a:stretch>
+        </p:blipFill>
+        <p:spPr>
+          <a:xfrm>
+            <a:off x="6858050" y="4950641"/>
+            <a:ext cx="2277871" cy="1509312"/>
+          </a:xfrm>
+          <a:prstGeom prst="rect">
+            <a:avLst/>
+          </a:prstGeom>
+        </p:spPr>
+      </p:pic>
     </p:spTree>
     <p:extLst>
       <p:ext uri="{BB962C8B-B14F-4D97-AF65-F5344CB8AC3E}">

</xml_diff>